<commit_message>
Add Methodology Slide to Presentation
</commit_message>
<xml_diff>
--- a/Public_Policy_Presentation.pptx
+++ b/Public_Policy_Presentation.pptx
@@ -232,7 +232,7 @@
           <a:p>
             <a:fld id="{F68ABEA4-9216-4FDF-AAE1-D8632908A8EC}" type="datetimeFigureOut">
               <a:rPr lang="de-CH" smtClean="0"/>
-              <a:t>23.05.2025</a:t>
+              <a:t>24.05.2025</a:t>
             </a:fld>
             <a:endParaRPr lang="de-CH"/>
           </a:p>
@@ -409,7 +409,7 @@
           <a:p>
             <a:fld id="{4B78A90D-FE7E-41AF-B03D-808D82937CB9}" type="datetimeFigureOut">
               <a:rPr lang="de-CH" smtClean="0"/>
-              <a:t>23.05.2025</a:t>
+              <a:t>24.05.2025</a:t>
             </a:fld>
             <a:endParaRPr lang="de-CH"/>
           </a:p>
@@ -1166,7 +1166,7 @@
           <a:p>
             <a:fld id="{9C26206A-A7FF-4A2F-A4EA-EDA7D9956B8C}" type="datetime1">
               <a:rPr lang="de-CH" noProof="0" smtClean="0"/>
-              <a:t>23.05.2025</a:t>
+              <a:t>24.05.2025</a:t>
             </a:fld>
             <a:endParaRPr lang="de-CH" noProof="0"/>
           </a:p>
@@ -1361,7 +1361,7 @@
           <a:p>
             <a:fld id="{AE2B7ECC-AD5B-4AE2-A84F-7ABFC0424E38}" type="datetime1">
               <a:rPr lang="de-CH" noProof="0" smtClean="0"/>
-              <a:t>23.05.2025</a:t>
+              <a:t>24.05.2025</a:t>
             </a:fld>
             <a:endParaRPr lang="de-CH" noProof="0"/>
           </a:p>
@@ -1648,7 +1648,7 @@
           <a:p>
             <a:fld id="{5FA21818-B1F9-4DD3-88F2-43FBC3C9BAF5}" type="datetime1">
               <a:rPr lang="de-CH" noProof="0" smtClean="0"/>
-              <a:t>23.05.2025</a:t>
+              <a:t>24.05.2025</a:t>
             </a:fld>
             <a:endParaRPr lang="de-CH" noProof="0"/>
           </a:p>
@@ -1946,7 +1946,7 @@
           <a:p>
             <a:fld id="{F570A20D-9FD8-4251-A734-1127FF21ADB2}" type="datetime1">
               <a:rPr lang="de-CH" noProof="0" smtClean="0"/>
-              <a:t>23.05.2025</a:t>
+              <a:t>24.05.2025</a:t>
             </a:fld>
             <a:endParaRPr lang="de-CH" noProof="0"/>
           </a:p>
@@ -2346,7 +2346,7 @@
           <a:p>
             <a:fld id="{BB5F4EA9-B322-4AC6-9ED4-333F1AAC8416}" type="datetime1">
               <a:rPr lang="de-CH" noProof="0" smtClean="0"/>
-              <a:t>23.05.2025</a:t>
+              <a:t>24.05.2025</a:t>
             </a:fld>
             <a:endParaRPr lang="de-CH" noProof="0"/>
           </a:p>
@@ -2714,7 +2714,7 @@
           <a:p>
             <a:fld id="{CFD59B2A-9722-4479-8974-FDB801910172}" type="datetime1">
               <a:rPr lang="de-CH" noProof="0" smtClean="0"/>
-              <a:t>23.05.2025</a:t>
+              <a:t>24.05.2025</a:t>
             </a:fld>
             <a:endParaRPr lang="de-CH" noProof="0"/>
           </a:p>
@@ -4743,7 +4743,7 @@
           <a:p>
             <a:fld id="{6861D6AC-3BAC-4A50-9479-1E7CD895A648}" type="datetime1">
               <a:rPr lang="de-CH" noProof="0" smtClean="0"/>
-              <a:t>23.05.2025</a:t>
+              <a:t>24.05.2025</a:t>
             </a:fld>
             <a:endParaRPr lang="de-CH" noProof="0"/>
           </a:p>
@@ -4991,7 +4991,7 @@
           <a:p>
             <a:fld id="{360162FC-E8FF-4D52-8F53-8F2A2A3AD348}" type="datetime1">
               <a:rPr lang="de-CH" noProof="0" smtClean="0"/>
-              <a:t>23.05.2025</a:t>
+              <a:t>24.05.2025</a:t>
             </a:fld>
             <a:endParaRPr lang="de-CH" noProof="0"/>
           </a:p>
@@ -5239,7 +5239,7 @@
           <a:p>
             <a:fld id="{56D5A3C0-7A2F-4A62-9057-882FB8F5659A}" type="datetime1">
               <a:rPr lang="de-CH" noProof="0" smtClean="0"/>
-              <a:t>23.05.2025</a:t>
+              <a:t>24.05.2025</a:t>
             </a:fld>
             <a:endParaRPr lang="de-CH" noProof="0"/>
           </a:p>
@@ -5515,7 +5515,7 @@
           <a:p>
             <a:fld id="{73923CAD-8964-4A8E-9E9C-0F755B932903}" type="datetime1">
               <a:rPr lang="de-CH" noProof="0" smtClean="0"/>
-              <a:t>23.05.2025</a:t>
+              <a:t>24.05.2025</a:t>
             </a:fld>
             <a:endParaRPr lang="de-CH" noProof="0"/>
           </a:p>
@@ -7446,7 +7446,7 @@
           <a:p>
             <a:fld id="{269E37AB-EE9C-4565-B2FD-B1FC504BEE2A}" type="datetime1">
               <a:rPr lang="de-CH" noProof="0" smtClean="0"/>
-              <a:t>23.05.2025</a:t>
+              <a:t>24.05.2025</a:t>
             </a:fld>
             <a:endParaRPr lang="de-CH" noProof="0"/>
           </a:p>
@@ -8518,7 +8518,7 @@
           <a:p>
             <a:fld id="{298B387B-FBD3-42F8-9E31-B45335F65718}" type="datetime1">
               <a:rPr lang="de-CH" noProof="0" smtClean="0"/>
-              <a:t>23.05.2025</a:t>
+              <a:t>24.05.2025</a:t>
             </a:fld>
             <a:endParaRPr lang="de-CH" noProof="0"/>
           </a:p>
@@ -8954,7 +8954,7 @@
           <a:p>
             <a:fld id="{298B387B-FBD3-42F8-9E31-B45335F65718}" type="datetime1">
               <a:rPr lang="de-CH" noProof="0" smtClean="0"/>
-              <a:t>23.05.2025</a:t>
+              <a:t>24.05.2025</a:t>
             </a:fld>
             <a:endParaRPr lang="de-CH" noProof="0"/>
           </a:p>
@@ -9299,16 +9299,125 @@
           <a:bodyPr/>
           <a:lstStyle/>
           <a:p>
-            <a:r>
-              <a:rPr lang="en-GB" dirty="0"/>
-              <a:t>Strategy</a:t>
-            </a:r>
-          </a:p>
-          <a:p>
-            <a:pPr marL="0" indent="0">
+            <a:pPr marL="0" indent="0" algn="ctr">
               <a:buNone/>
             </a:pPr>
-            <a:endParaRPr lang="en-CH" dirty="0"/>
+            <a:r>
+              <a:rPr lang="en-GB" sz="2000" b="1" dirty="0"/>
+              <a:t>Strategy</a:t>
+            </a:r>
+            <a:endParaRPr lang="en-GB" b="1" dirty="0"/>
+          </a:p>
+          <a:p>
+            <a:endParaRPr lang="en-GB" dirty="0"/>
+          </a:p>
+          <a:p>
+            <a:r>
+              <a:rPr lang="en-GB" sz="1400" b="1" dirty="0"/>
+              <a:t>Topic Modelling with LDA:</a:t>
+            </a:r>
+            <a:endParaRPr lang="en-GB" sz="1400" dirty="0"/>
+          </a:p>
+          <a:p>
+            <a:pPr marL="742950" lvl="1" indent="-285750">
+              <a:buFont typeface="Arial" panose="020B0604020202020204" pitchFamily="34" charset="0"/>
+              <a:buChar char="•"/>
+            </a:pPr>
+            <a:r>
+              <a:rPr lang="en-GB" sz="1400" dirty="0"/>
+              <a:t>Summarising most important topics and themes</a:t>
+            </a:r>
+          </a:p>
+          <a:p>
+            <a:pPr marL="742950" lvl="1" indent="-285750">
+              <a:buFont typeface="Arial" panose="020B0604020202020204" pitchFamily="34" charset="0"/>
+              <a:buChar char="•"/>
+            </a:pPr>
+            <a:r>
+              <a:rPr lang="en-GB" sz="1400" dirty="0"/>
+              <a:t>Assign each document a score for each topic</a:t>
+            </a:r>
+          </a:p>
+          <a:p>
+            <a:r>
+              <a:rPr lang="en-GB" sz="1400" b="1" dirty="0"/>
+              <a:t>Predictive Modelling using Classification and BERT:</a:t>
+            </a:r>
+            <a:endParaRPr lang="en-GB" sz="1400" dirty="0"/>
+          </a:p>
+          <a:p>
+            <a:pPr marL="742950" lvl="1" indent="-285750">
+              <a:buFont typeface="Arial" panose="020B0604020202020204" pitchFamily="34" charset="0"/>
+              <a:buChar char="•"/>
+            </a:pPr>
+            <a:r>
+              <a:rPr lang="en-GB" sz="1400" dirty="0"/>
+              <a:t>Logistic regression predicts bill passage using topic proportions and state-level political/economic indicators</a:t>
+            </a:r>
+          </a:p>
+          <a:p>
+            <a:pPr marL="742950" lvl="1" indent="-285750">
+              <a:buFont typeface="Arial" panose="020B0604020202020204" pitchFamily="34" charset="0"/>
+              <a:buChar char="•"/>
+            </a:pPr>
+            <a:r>
+              <a:rPr lang="en-GB" sz="1400" dirty="0"/>
+              <a:t>Highlights which topics most influence legislative success</a:t>
+            </a:r>
+          </a:p>
+          <a:p>
+            <a:r>
+              <a:rPr lang="en-GB" sz="1400" b="1" dirty="0"/>
+              <a:t>Drawing conclusions based on predictors:</a:t>
+            </a:r>
+            <a:endParaRPr lang="en-GB" sz="1400" dirty="0"/>
+          </a:p>
+          <a:p>
+            <a:pPr marL="742950" lvl="1" indent="-285750">
+              <a:buFont typeface="Arial" panose="020B0604020202020204" pitchFamily="34" charset="0"/>
+              <a:buChar char="•"/>
+            </a:pPr>
+            <a:r>
+              <a:rPr lang="en-GB" sz="1400" dirty="0"/>
+              <a:t>What are the predictors of bill survival?</a:t>
+            </a:r>
+          </a:p>
+          <a:p>
+            <a:pPr marL="742950" lvl="1" indent="-285750">
+              <a:buFont typeface="Arial" panose="020B0604020202020204" pitchFamily="34" charset="0"/>
+              <a:buChar char="•"/>
+            </a:pPr>
+            <a:r>
+              <a:rPr lang="en-GB" sz="1400" dirty="0"/>
+              <a:t>What are the main topics of AI legislature?</a:t>
+            </a:r>
+          </a:p>
+          <a:p>
+            <a:pPr marL="742950" lvl="1" indent="-285750">
+              <a:buFont typeface="Arial" panose="020B0604020202020204" pitchFamily="34" charset="0"/>
+              <a:buChar char="•"/>
+            </a:pPr>
+            <a:r>
+              <a:rPr lang="en-GB" sz="1400" dirty="0"/>
+              <a:t>Where are most topics discussed?</a:t>
+            </a:r>
+          </a:p>
+          <a:p>
+            <a:pPr marL="742950" lvl="1" indent="-285750">
+              <a:buFont typeface="Arial" panose="020B0604020202020204" pitchFamily="34" charset="0"/>
+              <a:buChar char="•"/>
+            </a:pPr>
+            <a:r>
+              <a:rPr lang="en-GB" sz="1400" dirty="0"/>
+              <a:t>Etc…</a:t>
+            </a:r>
+          </a:p>
+          <a:p>
+            <a:pPr marL="742950" lvl="1" indent="-285750">
+              <a:buFont typeface="Arial" panose="020B0604020202020204" pitchFamily="34" charset="0"/>
+              <a:buChar char="•"/>
+            </a:pPr>
+            <a:endParaRPr lang="en-GB" sz="1400" dirty="0"/>
           </a:p>
         </p:txBody>
       </p:sp>
@@ -9335,7 +9444,7 @@
           <a:p>
             <a:fld id="{5FA21818-B1F9-4DD3-88F2-43FBC3C9BAF5}" type="datetime1">
               <a:rPr lang="de-CH" noProof="0" smtClean="0"/>
-              <a:t>23.05.2025</a:t>
+              <a:t>24.05.2025</a:t>
             </a:fld>
             <a:endParaRPr lang="de-CH" noProof="0"/>
           </a:p>
@@ -9421,14 +9530,14 @@
           </a:lstStyle>
           <a:p>
             <a:br>
-              <a:rPr lang="de-DE"/>
+              <a:rPr lang="de-DE" dirty="0"/>
             </a:br>
             <a:r>
-              <a:rPr lang="de-DE"/>
+              <a:rPr lang="de-DE" dirty="0"/>
               <a:t> </a:t>
             </a:r>
             <a:r>
-              <a:rPr lang="de-DE">
+              <a:rPr lang="de-DE" dirty="0" err="1">
                 <a:solidFill>
                   <a:schemeClr val="bg1"/>
                 </a:solidFill>
@@ -9460,7 +9569,7 @@
         <p:spPr>
           <a:xfrm>
             <a:off x="731836" y="1411397"/>
-            <a:ext cx="5040002" cy="4860000"/>
+            <a:ext cx="4774015" cy="4860000"/>
           </a:xfrm>
           <a:prstGeom prst="rect">
             <a:avLst/>
@@ -9635,14 +9744,179 @@
             </a:lvl9pPr>
           </a:lstStyle>
           <a:p>
-            <a:r>
-              <a:rPr lang="en-GB" dirty="0"/>
+            <a:pPr marL="0" indent="0" algn="ctr">
+              <a:buNone/>
+            </a:pPr>
+            <a:r>
+              <a:rPr lang="en-GB" sz="2000" b="1" dirty="0"/>
               <a:t>Data</a:t>
             </a:r>
+          </a:p>
+          <a:p>
+            <a:pPr marL="0" indent="0" algn="ctr">
+              <a:buNone/>
+            </a:pPr>
+            <a:endParaRPr lang="en-GB" b="1" dirty="0"/>
+          </a:p>
+          <a:p>
+            <a:r>
+              <a:rPr lang="en-GB" sz="1400" b="1" dirty="0"/>
+              <a:t>AGORA</a:t>
+            </a:r>
+            <a:r>
+              <a:rPr lang="en-GB" sz="1400" dirty="0"/>
+              <a:t> (AI </a:t>
+            </a:r>
+            <a:r>
+              <a:rPr lang="en-GB" sz="1400" dirty="0" err="1"/>
+              <a:t>GOvernance</a:t>
+            </a:r>
+            <a:r>
+              <a:rPr lang="en-GB" sz="1400" dirty="0"/>
+              <a:t> and Regulatory Archive) </a:t>
+            </a:r>
+          </a:p>
+          <a:p>
+            <a:pPr lvl="1">
+              <a:buFont typeface="Arial" panose="020B0604020202020204" pitchFamily="34" charset="0"/>
+              <a:buChar char="•"/>
+            </a:pPr>
+            <a:r>
+              <a:rPr lang="en-GB" sz="1400" dirty="0"/>
+              <a:t>Collected by the Emerging Technology Observatory</a:t>
+            </a:r>
+          </a:p>
+          <a:p>
+            <a:pPr lvl="1">
+              <a:buFont typeface="Arial" panose="020B0604020202020204" pitchFamily="34" charset="0"/>
+              <a:buChar char="•"/>
+            </a:pPr>
+            <a:r>
+              <a:rPr lang="en-GB" sz="1400" dirty="0"/>
+              <a:t>AI-related laws, regulations, standards, and governance documents including full text documents</a:t>
+            </a:r>
+            <a:br>
+              <a:rPr lang="en-GB" sz="1400" dirty="0"/>
+            </a:br>
+            <a:endParaRPr lang="en-GB" sz="1400" dirty="0"/>
+          </a:p>
+          <a:p>
+            <a:r>
+              <a:rPr lang="en-GB" sz="1400" b="1" dirty="0"/>
+              <a:t>Dimensions</a:t>
+            </a:r>
+          </a:p>
+          <a:p>
+            <a:pPr lvl="1">
+              <a:buFont typeface="Arial" panose="020B0604020202020204" pitchFamily="34" charset="0"/>
+              <a:buChar char="•"/>
+            </a:pPr>
+            <a:r>
+              <a:rPr lang="en-GB" sz="1400" dirty="0"/>
+              <a:t>650 Observations / 101 Variables</a:t>
+            </a:r>
+          </a:p>
+          <a:p>
+            <a:pPr lvl="1">
+              <a:buFont typeface="Arial" panose="020B0604020202020204" pitchFamily="34" charset="0"/>
+              <a:buChar char="•"/>
+            </a:pPr>
+            <a:r>
+              <a:rPr lang="en-GB" sz="1400" dirty="0"/>
+              <a:t>Main variable of interest: </a:t>
+            </a:r>
+            <a:r>
+              <a:rPr lang="en-GB" sz="1400" i="1" dirty="0"/>
+              <a:t>Status of Document </a:t>
+            </a:r>
+            <a:br>
+              <a:rPr lang="en-GB" sz="1400" i="1" dirty="0"/>
+            </a:br>
+            <a:endParaRPr lang="en-GB" sz="1400" dirty="0"/>
+          </a:p>
+          <a:p>
+            <a:r>
+              <a:rPr lang="en-GB" sz="1400" b="1" dirty="0"/>
+              <a:t>Geographic and </a:t>
+            </a:r>
+            <a:r>
+              <a:rPr lang="en-GB" sz="1400" b="1" dirty="0" err="1"/>
+              <a:t>Spacial</a:t>
+            </a:r>
+            <a:r>
+              <a:rPr lang="en-GB" sz="1400" b="1" dirty="0"/>
+              <a:t> Focus:</a:t>
+            </a:r>
+          </a:p>
+          <a:p>
+            <a:pPr lvl="1">
+              <a:buFont typeface="Arial" panose="020B0604020202020204" pitchFamily="34" charset="0"/>
+              <a:buChar char="•"/>
+            </a:pPr>
+            <a:r>
+              <a:rPr lang="en-GB" sz="1400" dirty="0"/>
+              <a:t>US Legislature</a:t>
+            </a:r>
+          </a:p>
+          <a:p>
+            <a:pPr lvl="1">
+              <a:buFont typeface="Arial" panose="020B0604020202020204" pitchFamily="34" charset="0"/>
+              <a:buChar char="•"/>
+            </a:pPr>
+            <a:r>
+              <a:rPr lang="en-GB" sz="1400" dirty="0"/>
+              <a:t>From 2016-2024</a:t>
+            </a:r>
+          </a:p>
+          <a:p>
+            <a:pPr lvl="1"/>
             <a:endParaRPr lang="en-CH" dirty="0"/>
           </a:p>
         </p:txBody>
       </p:sp>
+      <p:cxnSp>
+        <p:nvCxnSpPr>
+          <p:cNvPr id="5" name="Straight Connector 4">
+            <a:extLst>
+              <a:ext uri="{FF2B5EF4-FFF2-40B4-BE49-F238E27FC236}">
+                <a16:creationId xmlns:a16="http://schemas.microsoft.com/office/drawing/2014/main" id="{A1891FB5-6ADE-A903-D4B5-AB4106E70DF8}"/>
+              </a:ext>
+            </a:extLst>
+          </p:cNvPr>
+          <p:cNvCxnSpPr>
+            <a:cxnSpLocks/>
+          </p:cNvCxnSpPr>
+          <p:nvPr/>
+        </p:nvCxnSpPr>
+        <p:spPr>
+          <a:xfrm>
+            <a:off x="5580438" y="1160351"/>
+            <a:ext cx="1" cy="5794926"/>
+          </a:xfrm>
+          <a:prstGeom prst="line">
+            <a:avLst/>
+          </a:prstGeom>
+          <a:ln>
+            <a:solidFill>
+              <a:srgbClr val="031F2B"/>
+            </a:solidFill>
+          </a:ln>
+        </p:spPr>
+        <p:style>
+          <a:lnRef idx="1">
+            <a:schemeClr val="accent1"/>
+          </a:lnRef>
+          <a:fillRef idx="0">
+            <a:schemeClr val="accent1"/>
+          </a:fillRef>
+          <a:effectRef idx="0">
+            <a:schemeClr val="accent1"/>
+          </a:effectRef>
+          <a:fontRef idx="minor">
+            <a:schemeClr val="tx1"/>
+          </a:fontRef>
+        </p:style>
+      </p:cxnSp>
     </p:spTree>
     <p:extLst>
       <p:ext uri="{BB962C8B-B14F-4D97-AF65-F5344CB8AC3E}">
@@ -9836,7 +10110,7 @@
           <a:p>
             <a:fld id="{298B387B-FBD3-42F8-9E31-B45335F65718}" type="datetime1">
               <a:rPr lang="de-CH" noProof="0" smtClean="0"/>
-              <a:t>23.05.2025</a:t>
+              <a:t>24.05.2025</a:t>
             </a:fld>
             <a:endParaRPr lang="de-CH" noProof="0"/>
           </a:p>
@@ -10053,7 +10327,7 @@
           <a:p>
             <a:fld id="{298B387B-FBD3-42F8-9E31-B45335F65718}" type="datetime1">
               <a:rPr lang="de-CH" noProof="0" smtClean="0"/>
-              <a:t>23.05.2025</a:t>
+              <a:t>24.05.2025</a:t>
             </a:fld>
             <a:endParaRPr lang="de-CH" noProof="0"/>
           </a:p>
@@ -10357,7 +10631,7 @@
           <a:p>
             <a:fld id="{298B387B-FBD3-42F8-9E31-B45335F65718}" type="datetime1">
               <a:rPr lang="de-CH" noProof="0" smtClean="0"/>
-              <a:t>23.05.2025</a:t>
+              <a:t>24.05.2025</a:t>
             </a:fld>
             <a:endParaRPr lang="de-CH" noProof="0"/>
           </a:p>

</xml_diff>